<commit_message>
Sunday - 1/12/2024 - 17:38
</commit_message>
<xml_diff>
--- a/ICDL/Session 06.pptx
+++ b/ICDL/Session 06.pptx
@@ -5,7 +5,7 @@
     <p:sldMasterId id="2147483648" r:id="rId1"/>
   </p:sldMasterIdLst>
   <p:notesMasterIdLst>
-    <p:notesMasterId r:id="rId8"/>
+    <p:notesMasterId r:id="rId9"/>
   </p:notesMasterIdLst>
   <p:sldIdLst>
     <p:sldId id="256" r:id="rId2"/>
@@ -14,6 +14,7 @@
     <p:sldId id="260" r:id="rId5"/>
     <p:sldId id="261" r:id="rId6"/>
     <p:sldId id="262" r:id="rId7"/>
+    <p:sldId id="263" r:id="rId8"/>
   </p:sldIdLst>
   <p:sldSz cx="12192000" cy="6858000"/>
   <p:notesSz cx="6858000" cy="9144000"/>
@@ -123,9 +124,16 @@
             <p14:sldId id="260"/>
             <p14:sldId id="261"/>
             <p14:sldId id="262"/>
+            <p14:sldId id="263"/>
           </p14:sldIdLst>
         </p14:section>
       </p14:sectionLst>
+    </p:ext>
+    <p:ext uri="{EFAFB233-063F-42B5-8137-9DF3F51BA10A}">
+      <p15:sldGuideLst xmlns:p15="http://schemas.microsoft.com/office/powerpoint/2012/main"/>
+    </p:ext>
+    <p:ext uri="{2D200454-40CA-4A62-9FC3-DE9A4176ACB9}">
+      <p15:notesGuideLst xmlns:p15="http://schemas.microsoft.com/office/powerpoint/2012/main"/>
     </p:ext>
   </p:extLst>
 </p:presentation>
@@ -4714,7 +4722,7 @@
           </a:p>
           <a:p>
             <a:r>
-              <a:rPr lang="en-US" sz="3600" b="1">
+              <a:rPr lang="en-US" sz="3600" b="1" dirty="0">
                 <a:solidFill>
                   <a:srgbClr val="1E2860"/>
                 </a:solidFill>
@@ -4724,14 +4732,6 @@
               </a:rPr>
               <a:t>Draw Tab</a:t>
             </a:r>
-            <a:endParaRPr lang="en-US" sz="3600" b="1" dirty="0">
-              <a:solidFill>
-                <a:srgbClr val="1E2860"/>
-              </a:solidFill>
-              <a:latin typeface="inherit"/>
-              <a:ea typeface="+mj-ea"/>
-              <a:cs typeface="+mj-cs"/>
-            </a:endParaRPr>
           </a:p>
         </p:txBody>
       </p:sp>
@@ -4739,6 +4739,92 @@
     <p:extLst>
       <p:ext uri="{BB962C8B-B14F-4D97-AF65-F5344CB8AC3E}">
         <p14:creationId xmlns:p14="http://schemas.microsoft.com/office/powerpoint/2010/main" val="2368923217"/>
+      </p:ext>
+    </p:extLst>
+  </p:cSld>
+  <p:clrMapOvr>
+    <a:masterClrMapping/>
+  </p:clrMapOvr>
+</p:sld>
+</file>
+
+<file path=ppt/slides/slide7.xml><?xml version="1.0" encoding="utf-8"?>
+<p:sld xmlns:a="http://schemas.openxmlformats.org/drawingml/2006/main" xmlns:r="http://schemas.openxmlformats.org/officeDocument/2006/relationships" xmlns:p="http://schemas.openxmlformats.org/presentationml/2006/main">
+  <p:cSld>
+    <p:spTree>
+      <p:nvGrpSpPr>
+        <p:cNvPr id="1" name=""/>
+        <p:cNvGrpSpPr/>
+        <p:nvPr/>
+      </p:nvGrpSpPr>
+      <p:grpSpPr>
+        <a:xfrm>
+          <a:off x="0" y="0"/>
+          <a:ext cx="0" cy="0"/>
+          <a:chOff x="0" y="0"/>
+          <a:chExt cx="0" cy="0"/>
+        </a:xfrm>
+      </p:grpSpPr>
+      <p:sp>
+        <p:nvSpPr>
+          <p:cNvPr id="2" name="Title 1">
+            <a:extLst>
+              <a:ext uri="{FF2B5EF4-FFF2-40B4-BE49-F238E27FC236}">
+                <a16:creationId xmlns:a16="http://schemas.microsoft.com/office/drawing/2014/main" id="{78CB05DA-D211-80E1-1F33-0337D7AEC36C}"/>
+              </a:ext>
+            </a:extLst>
+          </p:cNvPr>
+          <p:cNvSpPr>
+            <a:spLocks noGrp="1"/>
+          </p:cNvSpPr>
+          <p:nvPr>
+            <p:ph type="ctrTitle"/>
+          </p:nvPr>
+        </p:nvSpPr>
+        <p:spPr/>
+        <p:txBody>
+          <a:bodyPr/>
+          <a:lstStyle/>
+          <a:p>
+            <a:r>
+              <a:rPr lang="en-US" dirty="0"/>
+              <a:t>ICDL</a:t>
+            </a:r>
+          </a:p>
+        </p:txBody>
+      </p:sp>
+      <p:sp>
+        <p:nvSpPr>
+          <p:cNvPr id="3" name="Subtitle 2">
+            <a:extLst>
+              <a:ext uri="{FF2B5EF4-FFF2-40B4-BE49-F238E27FC236}">
+                <a16:creationId xmlns:a16="http://schemas.microsoft.com/office/drawing/2014/main" id="{61D98E8B-341D-F252-9DEC-BF9045D32F9C}"/>
+              </a:ext>
+            </a:extLst>
+          </p:cNvPr>
+          <p:cNvSpPr>
+            <a:spLocks noGrp="1"/>
+          </p:cNvSpPr>
+          <p:nvPr>
+            <p:ph type="subTitle" idx="1"/>
+          </p:nvPr>
+        </p:nvSpPr>
+        <p:spPr/>
+        <p:txBody>
+          <a:bodyPr/>
+          <a:lstStyle/>
+          <a:p>
+            <a:r>
+              <a:rPr lang="en-US" dirty="0"/>
+              <a:t>Power Point</a:t>
+            </a:r>
+          </a:p>
+        </p:txBody>
+      </p:sp>
+    </p:spTree>
+    <p:extLst>
+      <p:ext uri="{BB962C8B-B14F-4D97-AF65-F5344CB8AC3E}">
+        <p14:creationId xmlns:p14="http://schemas.microsoft.com/office/powerpoint/2010/main" val="3777286348"/>
       </p:ext>
     </p:extLst>
   </p:cSld>

</xml_diff>